<commit_message>
Changed ordering and CodeMash logo
</commit_message>
<xml_diff>
--- a/03-Patterns.pptx
+++ b/03-Patterns.pptx
@@ -154,7 +154,7 @@
   </p:defaultTextStyle>
   <p:extLst>
     <p:ext uri="{EFAFB233-063F-42B5-8137-9DF3F51BA10A}">
-      <p15:sldGuideLst xmlns:p15="http://schemas.microsoft.com/office/powerpoint/2012/main" xmlns="">
+      <p15:sldGuideLst xmlns="" xmlns:p15="http://schemas.microsoft.com/office/powerpoint/2012/main">
         <p15:guide id="1" orient="horz" pos="2160">
           <p15:clr>
             <a:srgbClr val="A4A3A4"/>
@@ -1225,540 +1225,6 @@
       <dsp:cNvGrpSpPr/>
     </dsp:nvGrpSpPr>
     <dsp:grpSpPr/>
-    <dsp:sp modelId="{A9873CE5-900B-4A1D-B7B6-150CD0348168}">
-      <dsp:nvSpPr>
-        <dsp:cNvPr id="0" name=""/>
-        <dsp:cNvSpPr/>
-      </dsp:nvSpPr>
-      <dsp:spPr>
-        <a:xfrm>
-          <a:off x="3377431" y="342"/>
-          <a:ext cx="1474737" cy="1474737"/>
-        </a:xfrm>
-        <a:prstGeom prst="ellipse">
-          <a:avLst/>
-        </a:prstGeom>
-        <a:gradFill rotWithShape="0">
-          <a:gsLst>
-            <a:gs pos="0">
-              <a:schemeClr val="accent1">
-                <a:hueOff val="0"/>
-                <a:satOff val="0"/>
-                <a:lumOff val="0"/>
-                <a:alphaOff val="0"/>
-                <a:tint val="50000"/>
-                <a:satMod val="300000"/>
-              </a:schemeClr>
-            </a:gs>
-            <a:gs pos="35000">
-              <a:schemeClr val="accent1">
-                <a:hueOff val="0"/>
-                <a:satOff val="0"/>
-                <a:lumOff val="0"/>
-                <a:alphaOff val="0"/>
-                <a:tint val="37000"/>
-                <a:satMod val="300000"/>
-              </a:schemeClr>
-            </a:gs>
-            <a:gs pos="100000">
-              <a:schemeClr val="accent1">
-                <a:hueOff val="0"/>
-                <a:satOff val="0"/>
-                <a:lumOff val="0"/>
-                <a:alphaOff val="0"/>
-                <a:tint val="15000"/>
-                <a:satMod val="350000"/>
-              </a:schemeClr>
-            </a:gs>
-          </a:gsLst>
-          <a:lin ang="16200000" scaled="1"/>
-        </a:gradFill>
-        <a:ln>
-          <a:noFill/>
-        </a:ln>
-        <a:effectLst>
-          <a:outerShdw blurRad="40000" dist="20000" dir="5400000" rotWithShape="0">
-            <a:srgbClr val="000000">
-              <a:alpha val="38000"/>
-            </a:srgbClr>
-          </a:outerShdw>
-        </a:effectLst>
-        <a:scene3d>
-          <a:camera prst="orthographicFront"/>
-          <a:lightRig rig="flat" dir="t"/>
-        </a:scene3d>
-        <a:sp3d prstMaterial="dkEdge">
-          <a:bevelT w="8200" h="38100"/>
-        </a:sp3d>
-      </dsp:spPr>
-      <dsp:style>
-        <a:lnRef idx="0">
-          <a:scrgbClr r="0" g="0" b="0"/>
-        </a:lnRef>
-        <a:fillRef idx="2">
-          <a:scrgbClr r="0" g="0" b="0"/>
-        </a:fillRef>
-        <a:effectRef idx="1">
-          <a:scrgbClr r="0" g="0" b="0"/>
-        </a:effectRef>
-        <a:fontRef idx="minor">
-          <a:schemeClr val="dk1"/>
-        </a:fontRef>
-      </dsp:style>
-      <dsp:txBody>
-        <a:bodyPr spcFirstLastPara="0" vert="horz" wrap="square" lIns="24130" tIns="24130" rIns="24130" bIns="24130" numCol="1" spcCol="1270" anchor="ctr" anchorCtr="0">
-          <a:noAutofit/>
-        </a:bodyPr>
-        <a:lstStyle/>
-        <a:p>
-          <a:pPr lvl="0" algn="ctr" defTabSz="844550">
-            <a:lnSpc>
-              <a:spcPct val="90000"/>
-            </a:lnSpc>
-            <a:spcBef>
-              <a:spcPct val="0"/>
-            </a:spcBef>
-            <a:spcAft>
-              <a:spcPct val="35000"/>
-            </a:spcAft>
-          </a:pPr>
-          <a:r>
-            <a:rPr lang="en-US" sz="1900" kern="1200" dirty="0" smtClean="0"/>
-            <a:t>Pending</a:t>
-          </a:r>
-          <a:endParaRPr lang="en-US" sz="1900" kern="1200" dirty="0"/>
-        </a:p>
-      </dsp:txBody>
-      <dsp:txXfrm>
-        <a:off x="3593401" y="216312"/>
-        <a:ext cx="1042797" cy="1042797"/>
-      </dsp:txXfrm>
-    </dsp:sp>
-    <dsp:sp modelId="{8E83AACC-B153-46D9-8255-9F790BC30C8D}">
-      <dsp:nvSpPr>
-        <dsp:cNvPr id="0" name=""/>
-        <dsp:cNvSpPr/>
-      </dsp:nvSpPr>
-      <dsp:spPr>
-        <a:xfrm rot="3600000">
-          <a:off x="4466807" y="1438745"/>
-          <a:ext cx="392830" cy="497724"/>
-        </a:xfrm>
-        <a:prstGeom prst="rightArrow">
-          <a:avLst>
-            <a:gd name="adj1" fmla="val 60000"/>
-            <a:gd name="adj2" fmla="val 50000"/>
-          </a:avLst>
-        </a:prstGeom>
-        <a:solidFill>
-          <a:srgbClr val="FFC000"/>
-        </a:solidFill>
-        <a:ln>
-          <a:noFill/>
-        </a:ln>
-        <a:effectLst>
-          <a:outerShdw blurRad="40000" dist="20000" dir="5400000" rotWithShape="0">
-            <a:srgbClr val="000000">
-              <a:alpha val="38000"/>
-            </a:srgbClr>
-          </a:outerShdw>
-        </a:effectLst>
-      </dsp:spPr>
-      <dsp:style>
-        <a:lnRef idx="0">
-          <a:scrgbClr r="0" g="0" b="0"/>
-        </a:lnRef>
-        <a:fillRef idx="2">
-          <a:scrgbClr r="0" g="0" b="0"/>
-        </a:fillRef>
-        <a:effectRef idx="1">
-          <a:scrgbClr r="0" g="0" b="0"/>
-        </a:effectRef>
-        <a:fontRef idx="minor">
-          <a:schemeClr val="dk1"/>
-        </a:fontRef>
-      </dsp:style>
-      <dsp:txBody>
-        <a:bodyPr spcFirstLastPara="0" vert="horz" wrap="square" lIns="0" tIns="0" rIns="0" bIns="0" numCol="1" spcCol="1270" anchor="ctr" anchorCtr="0">
-          <a:noAutofit/>
-        </a:bodyPr>
-        <a:lstStyle/>
-        <a:p>
-          <a:pPr lvl="0" algn="ctr" defTabSz="711200">
-            <a:lnSpc>
-              <a:spcPct val="90000"/>
-            </a:lnSpc>
-            <a:spcBef>
-              <a:spcPct val="0"/>
-            </a:spcBef>
-            <a:spcAft>
-              <a:spcPct val="35000"/>
-            </a:spcAft>
-          </a:pPr>
-          <a:endParaRPr lang="en-US" sz="1600" kern="1200"/>
-        </a:p>
-      </dsp:txBody>
-      <dsp:txXfrm>
-        <a:off x="4496269" y="1487260"/>
-        <a:ext cx="274981" cy="298634"/>
-      </dsp:txXfrm>
-    </dsp:sp>
-    <dsp:sp modelId="{12265EBA-9214-4B6D-85A3-F35EC9BD84B7}">
-      <dsp:nvSpPr>
-        <dsp:cNvPr id="0" name=""/>
-        <dsp:cNvSpPr/>
-      </dsp:nvSpPr>
-      <dsp:spPr>
-        <a:xfrm>
-          <a:off x="4485394" y="1919391"/>
-          <a:ext cx="1474737" cy="1474737"/>
-        </a:xfrm>
-        <a:prstGeom prst="ellipse">
-          <a:avLst/>
-        </a:prstGeom>
-        <a:gradFill rotWithShape="0">
-          <a:gsLst>
-            <a:gs pos="0">
-              <a:schemeClr val="accent1">
-                <a:hueOff val="0"/>
-                <a:satOff val="0"/>
-                <a:lumOff val="0"/>
-                <a:alphaOff val="0"/>
-                <a:tint val="50000"/>
-                <a:satMod val="300000"/>
-              </a:schemeClr>
-            </a:gs>
-            <a:gs pos="35000">
-              <a:schemeClr val="accent1">
-                <a:hueOff val="0"/>
-                <a:satOff val="0"/>
-                <a:lumOff val="0"/>
-                <a:alphaOff val="0"/>
-                <a:tint val="37000"/>
-                <a:satMod val="300000"/>
-              </a:schemeClr>
-            </a:gs>
-            <a:gs pos="100000">
-              <a:schemeClr val="accent1">
-                <a:hueOff val="0"/>
-                <a:satOff val="0"/>
-                <a:lumOff val="0"/>
-                <a:alphaOff val="0"/>
-                <a:tint val="15000"/>
-                <a:satMod val="350000"/>
-              </a:schemeClr>
-            </a:gs>
-          </a:gsLst>
-          <a:lin ang="16200000" scaled="1"/>
-        </a:gradFill>
-        <a:ln>
-          <a:noFill/>
-        </a:ln>
-        <a:effectLst>
-          <a:outerShdw blurRad="40000" dist="20000" dir="5400000" rotWithShape="0">
-            <a:srgbClr val="000000">
-              <a:alpha val="38000"/>
-            </a:srgbClr>
-          </a:outerShdw>
-        </a:effectLst>
-        <a:scene3d>
-          <a:camera prst="orthographicFront"/>
-          <a:lightRig rig="flat" dir="t"/>
-        </a:scene3d>
-        <a:sp3d prstMaterial="dkEdge">
-          <a:bevelT w="8200" h="38100"/>
-        </a:sp3d>
-      </dsp:spPr>
-      <dsp:style>
-        <a:lnRef idx="0">
-          <a:scrgbClr r="0" g="0" b="0"/>
-        </a:lnRef>
-        <a:fillRef idx="2">
-          <a:scrgbClr r="0" g="0" b="0"/>
-        </a:fillRef>
-        <a:effectRef idx="1">
-          <a:scrgbClr r="0" g="0" b="0"/>
-        </a:effectRef>
-        <a:fontRef idx="minor">
-          <a:schemeClr val="dk1"/>
-        </a:fontRef>
-      </dsp:style>
-      <dsp:txBody>
-        <a:bodyPr spcFirstLastPara="0" vert="horz" wrap="square" lIns="24130" tIns="24130" rIns="24130" bIns="24130" numCol="1" spcCol="1270" anchor="ctr" anchorCtr="0">
-          <a:noAutofit/>
-        </a:bodyPr>
-        <a:lstStyle/>
-        <a:p>
-          <a:pPr lvl="0" algn="ctr" defTabSz="844550">
-            <a:lnSpc>
-              <a:spcPct val="90000"/>
-            </a:lnSpc>
-            <a:spcBef>
-              <a:spcPct val="0"/>
-            </a:spcBef>
-            <a:spcAft>
-              <a:spcPct val="35000"/>
-            </a:spcAft>
-          </a:pPr>
-          <a:r>
-            <a:rPr lang="en-US" sz="1900" kern="1200" dirty="0" smtClean="0"/>
-            <a:t>Published</a:t>
-          </a:r>
-          <a:endParaRPr lang="en-US" sz="1900" kern="1200" dirty="0"/>
-        </a:p>
-      </dsp:txBody>
-      <dsp:txXfrm>
-        <a:off x="4701364" y="2135361"/>
-        <a:ext cx="1042797" cy="1042797"/>
-      </dsp:txXfrm>
-    </dsp:sp>
-    <dsp:sp modelId="{A7E410BE-02F7-430A-9F32-87E98534DD20}">
-      <dsp:nvSpPr>
-        <dsp:cNvPr id="0" name=""/>
-        <dsp:cNvSpPr/>
-      </dsp:nvSpPr>
-      <dsp:spPr>
-        <a:xfrm rot="10800000">
-          <a:off x="3929502" y="2407898"/>
-          <a:ext cx="392830" cy="497724"/>
-        </a:xfrm>
-        <a:prstGeom prst="rightArrow">
-          <a:avLst>
-            <a:gd name="adj1" fmla="val 60000"/>
-            <a:gd name="adj2" fmla="val 50000"/>
-          </a:avLst>
-        </a:prstGeom>
-        <a:solidFill>
-          <a:srgbClr val="FFC000"/>
-        </a:solidFill>
-        <a:ln>
-          <a:noFill/>
-        </a:ln>
-        <a:effectLst>
-          <a:outerShdw blurRad="40000" dist="20000" dir="5400000" rotWithShape="0">
-            <a:srgbClr val="000000">
-              <a:alpha val="38000"/>
-            </a:srgbClr>
-          </a:outerShdw>
-        </a:effectLst>
-      </dsp:spPr>
-      <dsp:style>
-        <a:lnRef idx="0">
-          <a:scrgbClr r="0" g="0" b="0"/>
-        </a:lnRef>
-        <a:fillRef idx="2">
-          <a:scrgbClr r="0" g="0" b="0"/>
-        </a:fillRef>
-        <a:effectRef idx="1">
-          <a:scrgbClr r="0" g="0" b="0"/>
-        </a:effectRef>
-        <a:fontRef idx="minor">
-          <a:schemeClr val="dk1"/>
-        </a:fontRef>
-      </dsp:style>
-      <dsp:txBody>
-        <a:bodyPr spcFirstLastPara="0" vert="horz" wrap="square" lIns="0" tIns="0" rIns="0" bIns="0" numCol="1" spcCol="1270" anchor="ctr" anchorCtr="0">
-          <a:noAutofit/>
-        </a:bodyPr>
-        <a:lstStyle/>
-        <a:p>
-          <a:pPr lvl="0" algn="ctr" defTabSz="711200">
-            <a:lnSpc>
-              <a:spcPct val="90000"/>
-            </a:lnSpc>
-            <a:spcBef>
-              <a:spcPct val="0"/>
-            </a:spcBef>
-            <a:spcAft>
-              <a:spcPct val="35000"/>
-            </a:spcAft>
-          </a:pPr>
-          <a:endParaRPr lang="en-US" sz="1600" kern="1200"/>
-        </a:p>
-      </dsp:txBody>
-      <dsp:txXfrm rot="10800000">
-        <a:off x="4047351" y="2507443"/>
-        <a:ext cx="274981" cy="298634"/>
-      </dsp:txXfrm>
-    </dsp:sp>
-    <dsp:sp modelId="{5B06571A-3A0E-4B29-A344-00CF6896A971}">
-      <dsp:nvSpPr>
-        <dsp:cNvPr id="0" name=""/>
-        <dsp:cNvSpPr/>
-      </dsp:nvSpPr>
-      <dsp:spPr>
-        <a:xfrm>
-          <a:off x="2269467" y="1919391"/>
-          <a:ext cx="1474737" cy="1474737"/>
-        </a:xfrm>
-        <a:prstGeom prst="ellipse">
-          <a:avLst/>
-        </a:prstGeom>
-        <a:gradFill rotWithShape="0">
-          <a:gsLst>
-            <a:gs pos="0">
-              <a:schemeClr val="accent1">
-                <a:hueOff val="0"/>
-                <a:satOff val="0"/>
-                <a:lumOff val="0"/>
-                <a:alphaOff val="0"/>
-                <a:tint val="50000"/>
-                <a:satMod val="300000"/>
-              </a:schemeClr>
-            </a:gs>
-            <a:gs pos="35000">
-              <a:schemeClr val="accent1">
-                <a:hueOff val="0"/>
-                <a:satOff val="0"/>
-                <a:lumOff val="0"/>
-                <a:alphaOff val="0"/>
-                <a:tint val="37000"/>
-                <a:satMod val="300000"/>
-              </a:schemeClr>
-            </a:gs>
-            <a:gs pos="100000">
-              <a:schemeClr val="accent1">
-                <a:hueOff val="0"/>
-                <a:satOff val="0"/>
-                <a:lumOff val="0"/>
-                <a:alphaOff val="0"/>
-                <a:tint val="15000"/>
-                <a:satMod val="350000"/>
-              </a:schemeClr>
-            </a:gs>
-          </a:gsLst>
-          <a:lin ang="16200000" scaled="1"/>
-        </a:gradFill>
-        <a:ln>
-          <a:noFill/>
-        </a:ln>
-        <a:effectLst>
-          <a:outerShdw blurRad="40000" dist="20000" dir="5400000" rotWithShape="0">
-            <a:srgbClr val="000000">
-              <a:alpha val="38000"/>
-            </a:srgbClr>
-          </a:outerShdw>
-        </a:effectLst>
-        <a:scene3d>
-          <a:camera prst="orthographicFront"/>
-          <a:lightRig rig="flat" dir="t"/>
-        </a:scene3d>
-        <a:sp3d prstMaterial="dkEdge">
-          <a:bevelT w="8200" h="38100"/>
-        </a:sp3d>
-      </dsp:spPr>
-      <dsp:style>
-        <a:lnRef idx="0">
-          <a:scrgbClr r="0" g="0" b="0"/>
-        </a:lnRef>
-        <a:fillRef idx="2">
-          <a:scrgbClr r="0" g="0" b="0"/>
-        </a:fillRef>
-        <a:effectRef idx="1">
-          <a:scrgbClr r="0" g="0" b="0"/>
-        </a:effectRef>
-        <a:fontRef idx="minor">
-          <a:schemeClr val="dk1"/>
-        </a:fontRef>
-      </dsp:style>
-      <dsp:txBody>
-        <a:bodyPr spcFirstLastPara="0" vert="horz" wrap="square" lIns="24130" tIns="24130" rIns="24130" bIns="24130" numCol="1" spcCol="1270" anchor="ctr" anchorCtr="0">
-          <a:noAutofit/>
-        </a:bodyPr>
-        <a:lstStyle/>
-        <a:p>
-          <a:pPr lvl="0" algn="ctr" defTabSz="844550">
-            <a:lnSpc>
-              <a:spcPct val="90000"/>
-            </a:lnSpc>
-            <a:spcBef>
-              <a:spcPct val="0"/>
-            </a:spcBef>
-            <a:spcAft>
-              <a:spcPct val="35000"/>
-            </a:spcAft>
-          </a:pPr>
-          <a:r>
-            <a:rPr lang="en-US" sz="1900" kern="1200" dirty="0" smtClean="0"/>
-            <a:t>Archived</a:t>
-          </a:r>
-          <a:endParaRPr lang="en-US" sz="1900" kern="1200" dirty="0"/>
-        </a:p>
-      </dsp:txBody>
-      <dsp:txXfrm>
-        <a:off x="2485437" y="2135361"/>
-        <a:ext cx="1042797" cy="1042797"/>
-      </dsp:txXfrm>
-    </dsp:sp>
-    <dsp:sp modelId="{44BFA5A8-46AD-427B-A345-20997D0381D0}">
-      <dsp:nvSpPr>
-        <dsp:cNvPr id="0" name=""/>
-        <dsp:cNvSpPr/>
-      </dsp:nvSpPr>
-      <dsp:spPr>
-        <a:xfrm rot="18000000">
-          <a:off x="3358844" y="1458002"/>
-          <a:ext cx="392830" cy="497724"/>
-        </a:xfrm>
-        <a:prstGeom prst="rightArrow">
-          <a:avLst>
-            <a:gd name="adj1" fmla="val 60000"/>
-            <a:gd name="adj2" fmla="val 50000"/>
-          </a:avLst>
-        </a:prstGeom>
-        <a:solidFill>
-          <a:srgbClr val="FFC000"/>
-        </a:solidFill>
-        <a:ln>
-          <a:noFill/>
-        </a:ln>
-        <a:effectLst>
-          <a:outerShdw blurRad="40000" dist="20000" dir="5400000" rotWithShape="0">
-            <a:srgbClr val="000000">
-              <a:alpha val="38000"/>
-            </a:srgbClr>
-          </a:outerShdw>
-        </a:effectLst>
-      </dsp:spPr>
-      <dsp:style>
-        <a:lnRef idx="0">
-          <a:scrgbClr r="0" g="0" b="0"/>
-        </a:lnRef>
-        <a:fillRef idx="2">
-          <a:scrgbClr r="0" g="0" b="0"/>
-        </a:fillRef>
-        <a:effectRef idx="1">
-          <a:scrgbClr r="0" g="0" b="0"/>
-        </a:effectRef>
-        <a:fontRef idx="minor">
-          <a:schemeClr val="dk1"/>
-        </a:fontRef>
-      </dsp:style>
-      <dsp:txBody>
-        <a:bodyPr spcFirstLastPara="0" vert="horz" wrap="square" lIns="0" tIns="0" rIns="0" bIns="0" numCol="1" spcCol="1270" anchor="ctr" anchorCtr="0">
-          <a:noAutofit/>
-        </a:bodyPr>
-        <a:lstStyle/>
-        <a:p>
-          <a:pPr lvl="0" algn="ctr" defTabSz="711200">
-            <a:lnSpc>
-              <a:spcPct val="90000"/>
-            </a:lnSpc>
-            <a:spcBef>
-              <a:spcPct val="0"/>
-            </a:spcBef>
-            <a:spcAft>
-              <a:spcPct val="35000"/>
-            </a:spcAft>
-          </a:pPr>
-          <a:endParaRPr lang="en-US" sz="1600" kern="1200"/>
-        </a:p>
-      </dsp:txBody>
-      <dsp:txXfrm>
-        <a:off x="3388306" y="1608577"/>
-        <a:ext cx="274981" cy="298634"/>
-      </dsp:txXfrm>
-    </dsp:sp>
   </dsp:spTree>
 </dsp:drawing>
 </file>
@@ -3140,7 +2606,7 @@
               <a:pPr>
                 <a:defRPr/>
               </a:pPr>
-              <a:t>1/10/14</a:t>
+              <a:t>1/3/2015</a:t>
             </a:fld>
             <a:endParaRPr lang="en-US"/>
           </a:p>
@@ -3354,7 +2820,7 @@
               <a:pPr>
                 <a:defRPr/>
               </a:pPr>
-              <a:t>1/10/14</a:t>
+              <a:t>1/3/2015</a:t>
             </a:fld>
             <a:endParaRPr lang="en-US"/>
           </a:p>
@@ -3720,7 +3186,7 @@
             <a:tailEnd/>
           </a:ln>
           <a:extLst>
-            <a:ext uri="{909E8E84-426E-40dd-AFC4-6F175D3DCCD1}">
+            <a:ext uri="{909E8E84-426E-40DD-AFC4-6F175D3DCCD1}">
               <a14:hiddenFill xmlns:a14="http://schemas.microsoft.com/office/drawing/2010/main">
                 <a:solidFill>
                   <a:srgbClr val="FFFFFF"/>
@@ -3743,14 +3209,14 @@
         <p:spPr bwMode="auto">
           <a:noFill/>
           <a:extLst>
-            <a:ext uri="{909E8E84-426E-40dd-AFC4-6F175D3DCCD1}">
+            <a:ext uri="{909E8E84-426E-40DD-AFC4-6F175D3DCCD1}">
               <a14:hiddenFill xmlns:a14="http://schemas.microsoft.com/office/drawing/2010/main">
                 <a:solidFill>
                   <a:srgbClr val="FFFFFF"/>
                 </a:solidFill>
               </a14:hiddenFill>
             </a:ext>
-            <a:ext uri="{91240B29-F687-4f45-9708-019B960494DF}">
+            <a:ext uri="{91240B29-F687-4F45-9708-019B960494DF}">
               <a14:hiddenLine xmlns:a14="http://schemas.microsoft.com/office/drawing/2010/main" w="9525">
                 <a:solidFill>
                   <a:srgbClr val="000000"/>
@@ -3788,14 +3254,14 @@
         <p:spPr bwMode="auto">
           <a:noFill/>
           <a:extLst>
-            <a:ext uri="{909E8E84-426E-40dd-AFC4-6F175D3DCCD1}">
+            <a:ext uri="{909E8E84-426E-40DD-AFC4-6F175D3DCCD1}">
               <a14:hiddenFill xmlns:a14="http://schemas.microsoft.com/office/drawing/2010/main">
                 <a:solidFill>
                   <a:srgbClr val="FFFFFF"/>
                 </a:solidFill>
               </a14:hiddenFill>
             </a:ext>
-            <a:ext uri="{91240B29-F687-4f45-9708-019B960494DF}">
+            <a:ext uri="{91240B29-F687-4F45-9708-019B960494DF}">
               <a14:hiddenLine xmlns:a14="http://schemas.microsoft.com/office/drawing/2010/main" w="9525">
                 <a:solidFill>
                   <a:srgbClr val="000000"/>
@@ -4494,7 +3960,7 @@
             <a:tailEnd/>
           </a:ln>
           <a:extLst>
-            <a:ext uri="{909E8E84-426E-40dd-AFC4-6F175D3DCCD1}">
+            <a:ext uri="{909E8E84-426E-40DD-AFC4-6F175D3DCCD1}">
               <a14:hiddenFill xmlns:a14="http://schemas.microsoft.com/office/drawing/2010/main">
                 <a:solidFill>
                   <a:srgbClr val="FFFFFF"/>
@@ -4517,14 +3983,14 @@
         <p:spPr bwMode="auto">
           <a:noFill/>
           <a:extLst>
-            <a:ext uri="{909E8E84-426E-40dd-AFC4-6F175D3DCCD1}">
+            <a:ext uri="{909E8E84-426E-40DD-AFC4-6F175D3DCCD1}">
               <a14:hiddenFill xmlns:a14="http://schemas.microsoft.com/office/drawing/2010/main">
                 <a:solidFill>
                   <a:srgbClr val="FFFFFF"/>
                 </a:solidFill>
               </a14:hiddenFill>
             </a:ext>
-            <a:ext uri="{91240B29-F687-4f45-9708-019B960494DF}">
+            <a:ext uri="{91240B29-F687-4F45-9708-019B960494DF}">
               <a14:hiddenLine xmlns:a14="http://schemas.microsoft.com/office/drawing/2010/main" w="9525">
                 <a:solidFill>
                   <a:srgbClr val="000000"/>
@@ -4562,14 +4028,14 @@
         <p:spPr bwMode="auto">
           <a:noFill/>
           <a:extLst>
-            <a:ext uri="{909E8E84-426E-40dd-AFC4-6F175D3DCCD1}">
+            <a:ext uri="{909E8E84-426E-40DD-AFC4-6F175D3DCCD1}">
               <a14:hiddenFill xmlns:a14="http://schemas.microsoft.com/office/drawing/2010/main">
                 <a:solidFill>
                   <a:srgbClr val="FFFFFF"/>
                 </a:solidFill>
               </a14:hiddenFill>
             </a:ext>
-            <a:ext uri="{91240B29-F687-4f45-9708-019B960494DF}">
+            <a:ext uri="{91240B29-F687-4F45-9708-019B960494DF}">
               <a14:hiddenLine xmlns:a14="http://schemas.microsoft.com/office/drawing/2010/main" w="9525">
                 <a:solidFill>
                   <a:srgbClr val="000000"/>
@@ -4904,7 +4370,7 @@
           <a:p>
             <a:fld id="{5FCC9A04-83C5-4490-B32D-67E67F46E85B}" type="datetimeFigureOut">
               <a:rPr lang="en-US" smtClean="0"/>
-              <a:t>1/10/14</a:t>
+              <a:t>1/3/2015</a:t>
             </a:fld>
             <a:endParaRPr lang="en-US"/>
           </a:p>
@@ -5074,7 +4540,7 @@
           <a:p>
             <a:fld id="{5FCC9A04-83C5-4490-B32D-67E67F46E85B}" type="datetimeFigureOut">
               <a:rPr lang="en-US" smtClean="0"/>
-              <a:t>1/10/14</a:t>
+              <a:t>1/3/2015</a:t>
             </a:fld>
             <a:endParaRPr lang="en-US"/>
           </a:p>
@@ -5255,7 +4721,7 @@
           <a:p>
             <a:fld id="{5FCC9A04-83C5-4490-B32D-67E67F46E85B}" type="datetimeFigureOut">
               <a:rPr lang="en-US" smtClean="0"/>
-              <a:t>1/10/14</a:t>
+              <a:t>1/3/2015</a:t>
             </a:fld>
             <a:endParaRPr lang="en-US"/>
           </a:p>
@@ -5545,7 +5011,7 @@
           <a:p>
             <a:fld id="{5FCC9A04-83C5-4490-B32D-67E67F46E85B}" type="datetimeFigureOut">
               <a:rPr lang="en-US" smtClean="0"/>
-              <a:t>1/10/14</a:t>
+              <a:t>1/3/2015</a:t>
             </a:fld>
             <a:endParaRPr lang="en-US"/>
           </a:p>
@@ -5792,7 +5258,7 @@
           <a:p>
             <a:fld id="{5FCC9A04-83C5-4490-B32D-67E67F46E85B}" type="datetimeFigureOut">
               <a:rPr lang="en-US" smtClean="0"/>
-              <a:t>1/10/14</a:t>
+              <a:t>1/3/2015</a:t>
             </a:fld>
             <a:endParaRPr lang="en-US"/>
           </a:p>
@@ -6080,7 +5546,7 @@
           <a:p>
             <a:fld id="{5FCC9A04-83C5-4490-B32D-67E67F46E85B}" type="datetimeFigureOut">
               <a:rPr lang="en-US" smtClean="0"/>
-              <a:t>1/10/14</a:t>
+              <a:t>1/3/2015</a:t>
             </a:fld>
             <a:endParaRPr lang="en-US"/>
           </a:p>
@@ -6502,7 +5968,7 @@
           <a:p>
             <a:fld id="{5FCC9A04-83C5-4490-B32D-67E67F46E85B}" type="datetimeFigureOut">
               <a:rPr lang="en-US" smtClean="0"/>
-              <a:t>1/10/14</a:t>
+              <a:t>1/3/2015</a:t>
             </a:fld>
             <a:endParaRPr lang="en-US"/>
           </a:p>
@@ -6621,7 +6087,7 @@
           <a:p>
             <a:fld id="{5FCC9A04-83C5-4490-B32D-67E67F46E85B}" type="datetimeFigureOut">
               <a:rPr lang="en-US" smtClean="0"/>
-              <a:t>1/10/14</a:t>
+              <a:t>1/3/2015</a:t>
             </a:fld>
             <a:endParaRPr lang="en-US"/>
           </a:p>
@@ -6717,7 +6183,7 @@
           <a:p>
             <a:fld id="{5FCC9A04-83C5-4490-B32D-67E67F46E85B}" type="datetimeFigureOut">
               <a:rPr lang="en-US" smtClean="0"/>
-              <a:t>1/10/14</a:t>
+              <a:t>1/3/2015</a:t>
             </a:fld>
             <a:endParaRPr lang="en-US"/>
           </a:p>
@@ -6995,7 +6461,7 @@
           <a:p>
             <a:fld id="{5FCC9A04-83C5-4490-B32D-67E67F46E85B}" type="datetimeFigureOut">
               <a:rPr lang="en-US" smtClean="0"/>
-              <a:t>1/10/14</a:t>
+              <a:t>1/3/2015</a:t>
             </a:fld>
             <a:endParaRPr lang="en-US"/>
           </a:p>
@@ -7249,7 +6715,7 @@
           <a:p>
             <a:fld id="{5FCC9A04-83C5-4490-B32D-67E67F46E85B}" type="datetimeFigureOut">
               <a:rPr lang="en-US" smtClean="0"/>
-              <a:t>1/10/14</a:t>
+              <a:t>1/3/2015</a:t>
             </a:fld>
             <a:endParaRPr lang="en-US"/>
           </a:p>
@@ -7462,7 +6928,7 @@
           <a:p>
             <a:fld id="{5FCC9A04-83C5-4490-B32D-67E67F46E85B}" type="datetimeFigureOut">
               <a:rPr lang="en-US" smtClean="0"/>
-              <a:t>1/10/14</a:t>
+              <a:t>1/3/2015</a:t>
             </a:fld>
             <a:endParaRPr lang="en-US"/>
           </a:p>
@@ -7548,7 +7014,7 @@
       </p:sp>
       <p:pic>
         <p:nvPicPr>
-          <p:cNvPr id="7" name="Picture 6" descr="logo-codemash.png"/>
+          <p:cNvPr id="8" name="Picture 7"/>
           <p:cNvPicPr>
             <a:picLocks noChangeAspect="1"/>
           </p:cNvPicPr>
@@ -7568,8 +7034,8 @@
         </p:blipFill>
         <p:spPr>
           <a:xfrm>
-            <a:off x="2638" y="0"/>
-            <a:ext cx="909123" cy="927582"/>
+            <a:off x="109728" y="118872"/>
+            <a:ext cx="828675" cy="1009650"/>
           </a:xfrm>
           <a:prstGeom prst="rect">
             <a:avLst/>
@@ -8159,13 +7625,13 @@
   <p:clrMapOvr>
     <a:masterClrMapping/>
   </p:clrMapOvr>
-  <p:transition xmlns:p14="http://schemas.microsoft.com/office/powerpoint/2010/main" spd="slow">
+  <p:transition spd="slow">
     <p:push/>
   </p:transition>
   <p:timing>
     <p:tnLst>
       <p:par>
-        <p:cTn xmlns:p14="http://schemas.microsoft.com/office/powerpoint/2010/main" id="1" dur="indefinite" restart="never" nodeType="tmRoot"/>
+        <p:cTn id="1" dur="indefinite" restart="never" nodeType="tmRoot"/>
       </p:par>
     </p:tnLst>
   </p:timing>
@@ -8245,7 +7711,7 @@
   <p:timing>
     <p:tnLst>
       <p:par>
-        <p:cTn xmlns:p14="http://schemas.microsoft.com/office/powerpoint/2010/main" id="1" dur="indefinite" restart="never" nodeType="tmRoot"/>
+        <p:cTn id="1" dur="indefinite" restart="never" nodeType="tmRoot"/>
       </p:par>
     </p:tnLst>
   </p:timing>
@@ -8360,7 +7826,7 @@
   <p:timing>
     <p:tnLst>
       <p:par>
-        <p:cTn xmlns:p14="http://schemas.microsoft.com/office/powerpoint/2010/main" id="1" dur="indefinite" restart="never" nodeType="tmRoot"/>
+        <p:cTn id="1" dur="indefinite" restart="never" nodeType="tmRoot"/>
       </p:par>
     </p:tnLst>
   </p:timing>
@@ -8487,7 +7953,7 @@
   <p:timing>
     <p:tnLst>
       <p:par>
-        <p:cTn xmlns:p14="http://schemas.microsoft.com/office/powerpoint/2010/main" id="1" dur="indefinite" restart="never" nodeType="tmRoot"/>
+        <p:cTn id="1" dur="indefinite" restart="never" nodeType="tmRoot"/>
       </p:par>
     </p:tnLst>
   </p:timing>
@@ -8580,7 +8046,7 @@
   <p:timing>
     <p:tnLst>
       <p:par>
-        <p:cTn xmlns:p14="http://schemas.microsoft.com/office/powerpoint/2010/main" id="1" dur="indefinite" restart="never" nodeType="tmRoot"/>
+        <p:cTn id="1" dur="indefinite" restart="never" nodeType="tmRoot"/>
       </p:par>
     </p:tnLst>
   </p:timing>
@@ -8694,13 +8160,13 @@
   <p:clrMapOvr>
     <a:masterClrMapping/>
   </p:clrMapOvr>
-  <p:transition xmlns:p14="http://schemas.microsoft.com/office/powerpoint/2010/main" spd="slow">
+  <p:transition spd="slow">
     <p:push/>
   </p:transition>
   <p:timing>
     <p:tnLst>
       <p:par>
-        <p:cTn xmlns:p14="http://schemas.microsoft.com/office/powerpoint/2010/main" id="1" dur="indefinite" restart="never" nodeType="tmRoot">
+        <p:cTn id="1" dur="indefinite" restart="never" nodeType="tmRoot">
           <p:childTnLst>
             <p:seq concurrent="1" nextAc="seek">
               <p:cTn id="2" dur="indefinite" nodeType="mainSeq">
@@ -9094,7 +8560,7 @@
   <p:timing>
     <p:tnLst>
       <p:par>
-        <p:cTn xmlns:p14="http://schemas.microsoft.com/office/powerpoint/2010/main" id="1" dur="indefinite" restart="never" nodeType="tmRoot">
+        <p:cTn id="1" dur="indefinite" restart="never" nodeType="tmRoot">
           <p:childTnLst>
             <p:seq concurrent="1" nextAc="seek">
               <p:cTn id="2" dur="indefinite" nodeType="mainSeq">
@@ -9482,7 +8948,7 @@
   <p:timing>
     <p:tnLst>
       <p:par>
-        <p:cTn xmlns:p14="http://schemas.microsoft.com/office/powerpoint/2010/main" id="1" dur="indefinite" restart="never" nodeType="tmRoot"/>
+        <p:cTn id="1" dur="indefinite" restart="never" nodeType="tmRoot"/>
       </p:par>
     </p:tnLst>
   </p:timing>
@@ -9594,7 +9060,7 @@
   <p:timing>
     <p:tnLst>
       <p:par>
-        <p:cTn xmlns:p14="http://schemas.microsoft.com/office/powerpoint/2010/main" id="1" dur="indefinite" restart="never" nodeType="tmRoot">
+        <p:cTn id="1" dur="indefinite" restart="never" nodeType="tmRoot">
           <p:childTnLst>
             <p:seq concurrent="1" nextAc="seek">
               <p:cTn id="2" dur="indefinite" nodeType="mainSeq">
@@ -9973,7 +9439,7 @@
   <p:timing>
     <p:tnLst>
       <p:par>
-        <p:cTn xmlns:p14="http://schemas.microsoft.com/office/powerpoint/2010/main" id="1" dur="indefinite" restart="never" nodeType="tmRoot">
+        <p:cTn id="1" dur="indefinite" restart="never" nodeType="tmRoot">
           <p:childTnLst>
             <p:seq concurrent="1" nextAc="seek">
               <p:cTn id="2" dur="indefinite" nodeType="mainSeq">
@@ -10345,7 +9811,7 @@
   <p:timing>
     <p:tnLst>
       <p:par>
-        <p:cTn xmlns:p14="http://schemas.microsoft.com/office/powerpoint/2010/main" id="1" dur="indefinite" restart="never" nodeType="tmRoot">
+        <p:cTn id="1" dur="indefinite" restart="never" nodeType="tmRoot">
           <p:childTnLst>
             <p:seq concurrent="1" nextAc="seek">
               <p:cTn id="2" dur="indefinite" nodeType="mainSeq">
@@ -10701,7 +10167,7 @@
   <p:timing>
     <p:tnLst>
       <p:par>
-        <p:cTn xmlns:p14="http://schemas.microsoft.com/office/powerpoint/2010/main" id="1" dur="indefinite" restart="never" nodeType="tmRoot">
+        <p:cTn id="1" dur="indefinite" restart="never" nodeType="tmRoot">
           <p:childTnLst>
             <p:seq concurrent="1" nextAc="seek">
               <p:cTn id="2" dur="indefinite" nodeType="mainSeq">
@@ -11176,7 +10642,7 @@
   <p:timing>
     <p:tnLst>
       <p:par>
-        <p:cTn xmlns:p14="http://schemas.microsoft.com/office/powerpoint/2010/main" id="1" dur="indefinite" restart="never" nodeType="tmRoot"/>
+        <p:cTn id="1" dur="indefinite" restart="never" nodeType="tmRoot"/>
       </p:par>
     </p:tnLst>
   </p:timing>

</xml_diff>